<commit_message>
lecture ready : 250424
</commit_message>
<xml_diff>
--- a/material/06_CSharp_개발환경.pptx
+++ b/material/06_CSharp_개발환경.pptx
@@ -50,35 +50,35 @@
       <p:bold r:id="rId36"/>
     </p:embeddedFont>
     <p:embeddedFont>
-      <p:font typeface="Pretendard GOV" panose="020B0600000101010101" charset="-127"/>
+      <p:font typeface="AppleSDGothicNeoB00" panose="020B0600000101010101" charset="-127"/>
       <p:regular r:id="rId37"/>
-      <p:bold r:id="rId38"/>
+    </p:embeddedFont>
+    <p:embeddedFont>
+      <p:font typeface="Malgun Gothic Semilight" panose="020B0502040204020203" pitchFamily="50" charset="-127"/>
+      <p:regular r:id="rId38"/>
+    </p:embeddedFont>
+    <p:embeddedFont>
+      <p:font typeface="맑은 고딕" panose="020B0503020000020004" pitchFamily="50" charset="-127"/>
+      <p:regular r:id="rId39"/>
+      <p:bold r:id="rId40"/>
+    </p:embeddedFont>
+    <p:embeddedFont>
+      <p:font typeface="AppleSDGothicNeoH00" panose="020B0600000101010101" charset="-127"/>
+      <p:regular r:id="rId41"/>
+    </p:embeddedFont>
+    <p:embeddedFont>
+      <p:font typeface="맑은 고딕" panose="020B0503020000020004" pitchFamily="50" charset="-127"/>
+      <p:regular r:id="rId39"/>
+      <p:bold r:id="rId40"/>
     </p:embeddedFont>
     <p:embeddedFont>
       <p:font typeface="Pretendard GOV Black" panose="020B0600000101010101" charset="-127"/>
-      <p:bold r:id="rId39"/>
-    </p:embeddedFont>
-    <p:embeddedFont>
-      <p:font typeface="Malgun Gothic Semilight" panose="020B0502040204020203" pitchFamily="50" charset="-127"/>
-      <p:regular r:id="rId40"/>
-    </p:embeddedFont>
-    <p:embeddedFont>
-      <p:font typeface="맑은 고딕" panose="020B0503020000020004" pitchFamily="50" charset="-127"/>
-      <p:regular r:id="rId41"/>
       <p:bold r:id="rId42"/>
     </p:embeddedFont>
     <p:embeddedFont>
-      <p:font typeface="AppleSDGothicNeoH00" panose="020B0600000101010101" charset="-127"/>
+      <p:font typeface="Pretendard GOV" panose="020B0600000101010101" charset="-127"/>
       <p:regular r:id="rId43"/>
-    </p:embeddedFont>
-    <p:embeddedFont>
-      <p:font typeface="맑은 고딕" panose="020B0503020000020004" pitchFamily="50" charset="-127"/>
-      <p:regular r:id="rId41"/>
-      <p:bold r:id="rId42"/>
-    </p:embeddedFont>
-    <p:embeddedFont>
-      <p:font typeface="AppleSDGothicNeoB00" panose="020B0600000101010101" charset="-127"/>
-      <p:regular r:id="rId44"/>
+      <p:bold r:id="rId44"/>
     </p:embeddedFont>
   </p:embeddedFontLst>
   <p:defaultTextStyle>
@@ -269,7 +269,7 @@
           <a:p>
             <a:fld id="{2EF3F159-7250-4DD4-91C2-13B35D56E1AF}" type="datetimeFigureOut">
               <a:rPr lang="ko-KR" altLang="en-US" smtClean="0"/>
-              <a:t>2025-04-23</a:t>
+              <a:t>2025-04-25</a:t>
             </a:fld>
             <a:endParaRPr lang="ko-KR" altLang="en-US"/>
           </a:p>
@@ -2008,16 +2008,26 @@
               <a:t>들을 하나로 묶어주는 </a:t>
             </a:r>
             <a:r>
-              <a:rPr lang="en-US" altLang="ko-KR" b="1" dirty="0"/>
+              <a:rPr lang="en-US" altLang="ko-KR" b="1" dirty="0" smtClean="0"/>
               <a:t>"</a:t>
             </a:r>
             <a:r>
-              <a:rPr lang="ko-KR" altLang="en-US" b="1" dirty="0"/>
-              <a:t>큰 단위</a:t>
-            </a:r>
-            <a:r>
-              <a:rPr lang="en-US" altLang="ko-KR" b="1" dirty="0"/>
-              <a:t>"</a:t>
+              <a:rPr lang="ko-KR" altLang="en-US" b="1" dirty="0" smtClean="0"/>
+              <a:t>최상위 단위</a:t>
+            </a:r>
+            <a:r>
+              <a:rPr lang="en-US" altLang="ko-KR" b="1" dirty="0" smtClean="0"/>
+              <a:t>“</a:t>
+            </a:r>
+          </a:p>
+          <a:p>
+            <a:r>
+              <a:rPr lang="en-US" altLang="ko-KR" dirty="0" smtClean="0"/>
+              <a:t>- </a:t>
+            </a:r>
+            <a:r>
+              <a:rPr lang="ko-KR" altLang="en-US" dirty="0" smtClean="0"/>
+              <a:t>하나의 솔루션은 여러 개의 프로젝트를 포함</a:t>
             </a:r>
             <a:r>
               <a:rPr lang="ko-KR" altLang="en-US" dirty="0"/>
@@ -2111,20 +2121,32 @@
               <a:t>실제로 </a:t>
             </a:r>
             <a:r>
+              <a:rPr lang="ko-KR" altLang="en-US" b="1" dirty="0" smtClean="0"/>
+              <a:t>실행 가능한 단위</a:t>
+            </a:r>
+            <a:r>
+              <a:rPr lang="en-US" altLang="ko-KR" b="1" dirty="0" smtClean="0"/>
+              <a:t>,</a:t>
+            </a:r>
+            <a:r>
+              <a:rPr lang="ko-KR" altLang="en-US" b="1" dirty="0" smtClean="0"/>
+              <a:t> 즉 빌드할 </a:t>
+            </a:r>
+            <a:r>
               <a:rPr lang="ko-KR" altLang="en-US" b="1" dirty="0"/>
-              <a:t>실행하거나 빌드할 대상</a:t>
+              <a:t>대상</a:t>
             </a:r>
             <a:r>
               <a:rPr lang="en-US" altLang="ko-KR" dirty="0"/>
               <a:t>, </a:t>
             </a:r>
             <a:r>
-              <a:rPr lang="ko-KR" altLang="en-US" dirty="0"/>
-              <a:t>즉 </a:t>
+              <a:rPr lang="ko-KR" altLang="en-US" b="1" dirty="0" smtClean="0"/>
+              <a:t>작품의 </a:t>
             </a:r>
             <a:r>
               <a:rPr lang="ko-KR" altLang="en-US" b="1" dirty="0"/>
-              <a:t>작품의 본체</a:t>
+              <a:t>본체</a:t>
             </a:r>
             <a:r>
               <a:rPr lang="ko-KR" altLang="en-US" dirty="0"/>
@@ -2179,8 +2201,8 @@
               <a:t>프로젝트 안에 들어있는 실제 </a:t>
             </a:r>
             <a:r>
-              <a:rPr lang="ko-KR" altLang="en-US" b="1" dirty="0"/>
-              <a:t>코드</a:t>
+              <a:rPr lang="ko-KR" altLang="en-US" b="1" dirty="0" smtClean="0"/>
+              <a:t>소스코드</a:t>
             </a:r>
             <a:r>
               <a:rPr lang="en-US" altLang="ko-KR" b="1" dirty="0"/>
@@ -2201,6 +2223,9 @@
             <a:endParaRPr lang="ko-KR" altLang="en-US" dirty="0"/>
           </a:p>
           <a:p>
+            <a:endParaRPr lang="en-US" altLang="ko-KR" dirty="0" smtClean="0"/>
+          </a:p>
+          <a:p>
             <a:endParaRPr lang="en-US" altLang="ko-KR" dirty="0"/>
           </a:p>
           <a:p>
@@ -2213,14 +2238,9 @@
               <a:t>그림 </a:t>
             </a:r>
             <a:r>
-              <a:rPr lang="en-US" altLang="ko-KR" dirty="0"/>
+              <a:rPr lang="en-US" altLang="ko-KR" dirty="0" smtClean="0"/>
               <a:t>&gt;</a:t>
             </a:r>
-          </a:p>
-          <a:p>
-            <a:endParaRPr lang="en-US" altLang="ko-KR" dirty="0"/>
-          </a:p>
-          <a:p>
             <a:endParaRPr lang="en-US" altLang="ko-KR" dirty="0"/>
           </a:p>
           <a:p>
@@ -2234,8 +2254,13 @@
             </a:r>
             <a:r>
               <a:rPr lang="ko-KR" altLang="en-US" dirty="0"/>
-              <a:t>솔루션 전체</a:t>
-            </a:r>
+              <a:t>솔루션 </a:t>
+            </a:r>
+            <a:r>
+              <a:rPr lang="ko-KR" altLang="en-US" dirty="0" smtClean="0"/>
+              <a:t>이름</a:t>
+            </a:r>
+            <a:endParaRPr lang="ko-KR" altLang="en-US" dirty="0"/>
           </a:p>
           <a:p>
             <a:pPr>
@@ -2247,9 +2272,10 @@
               <a:t>WindowsFormsApp1: </a:t>
             </a:r>
             <a:r>
-              <a:rPr lang="ko-KR" altLang="en-US" dirty="0"/>
-              <a:t>프로젝트</a:t>
-            </a:r>
+              <a:rPr lang="ko-KR" altLang="en-US" dirty="0" smtClean="0"/>
+              <a:t>프로젝트 이름</a:t>
+            </a:r>
+            <a:endParaRPr lang="ko-KR" altLang="en-US" dirty="0"/>
           </a:p>
           <a:p>
             <a:pPr marL="742950" lvl="1" indent="-285750">
@@ -2262,8 +2288,121 @@
             </a:r>
             <a:r>
               <a:rPr lang="ko-KR" altLang="en-US" dirty="0"/>
-              <a:t>프로젝트 정보 및 설정</a:t>
-            </a:r>
+              <a:t>프로젝트 정보 및 </a:t>
+            </a:r>
+            <a:r>
+              <a:rPr lang="ko-KR" altLang="en-US" dirty="0" smtClean="0"/>
+              <a:t>설정</a:t>
+            </a:r>
+            <a:endParaRPr lang="en-US" altLang="ko-KR" dirty="0" smtClean="0"/>
+          </a:p>
+          <a:p>
+            <a:pPr marL="1200150" lvl="2" indent="-285750">
+              <a:buFont typeface="Arial" panose="020B0604020202020204" pitchFamily="34" charset="0"/>
+              <a:buChar char="•"/>
+            </a:pPr>
+            <a:r>
+              <a:rPr lang="en-US" altLang="ko-KR" dirty="0" err="1" smtClean="0"/>
+              <a:t>AssemblyInfo.cs</a:t>
+            </a:r>
+            <a:r>
+              <a:rPr lang="en-US" altLang="ko-KR" dirty="0" smtClean="0"/>
+              <a:t>: </a:t>
+            </a:r>
+            <a:r>
+              <a:rPr lang="ko-KR" altLang="en-US" dirty="0" smtClean="0"/>
+              <a:t>어셈블리 정보 </a:t>
+            </a:r>
+            <a:r>
+              <a:rPr lang="en-US" altLang="ko-KR" dirty="0" smtClean="0"/>
+              <a:t>(</a:t>
+            </a:r>
+            <a:r>
+              <a:rPr lang="ko-KR" altLang="en-US" dirty="0" smtClean="0"/>
+              <a:t>제목</a:t>
+            </a:r>
+            <a:r>
+              <a:rPr lang="en-US" altLang="ko-KR" dirty="0" smtClean="0"/>
+              <a:t>, </a:t>
+            </a:r>
+            <a:r>
+              <a:rPr lang="ko-KR" altLang="en-US" dirty="0" smtClean="0"/>
+              <a:t>버전 등</a:t>
+            </a:r>
+            <a:r>
+              <a:rPr lang="en-US" altLang="ko-KR" dirty="0" smtClean="0"/>
+              <a:t>)</a:t>
+            </a:r>
+            <a:r>
+              <a:rPr lang="ko-KR" altLang="en-US" dirty="0" smtClean="0"/>
+              <a:t>를 담고 있는 메타데이터 파일</a:t>
+            </a:r>
+            <a:r>
+              <a:rPr lang="en-US" altLang="ko-KR" dirty="0" smtClean="0"/>
+              <a:t>.</a:t>
+            </a:r>
+          </a:p>
+          <a:p>
+            <a:pPr marL="1200150" lvl="2" indent="-285750">
+              <a:buFont typeface="Arial" panose="020B0604020202020204" pitchFamily="34" charset="0"/>
+              <a:buChar char="•"/>
+            </a:pPr>
+            <a:r>
+              <a:rPr lang="en-US" altLang="ko-KR" dirty="0" err="1" smtClean="0"/>
+              <a:t>Resources.resx</a:t>
+            </a:r>
+            <a:r>
+              <a:rPr lang="en-US" altLang="ko-KR" dirty="0" smtClean="0"/>
+              <a:t>: </a:t>
+            </a:r>
+            <a:r>
+              <a:rPr lang="ko-KR" altLang="en-US" dirty="0" smtClean="0"/>
+              <a:t>이미지</a:t>
+            </a:r>
+            <a:r>
+              <a:rPr lang="en-US" altLang="ko-KR" dirty="0" smtClean="0"/>
+              <a:t>,</a:t>
+            </a:r>
+            <a:r>
+              <a:rPr lang="en-US" altLang="ko-KR" baseline="0" dirty="0" smtClean="0"/>
+              <a:t> </a:t>
+            </a:r>
+            <a:r>
+              <a:rPr lang="ko-KR" altLang="en-US" baseline="0" dirty="0" smtClean="0"/>
+              <a:t>아이콘 등 리소스를 관리하는 </a:t>
+            </a:r>
+            <a:r>
+              <a:rPr lang="en-US" altLang="ko-KR" baseline="0" dirty="0" smtClean="0"/>
+              <a:t>XML </a:t>
+            </a:r>
+            <a:r>
+              <a:rPr lang="ko-KR" altLang="en-US" baseline="0" dirty="0" smtClean="0"/>
+              <a:t>기반 파일</a:t>
+            </a:r>
+            <a:endParaRPr lang="en-US" altLang="ko-KR" baseline="0" dirty="0" smtClean="0"/>
+          </a:p>
+          <a:p>
+            <a:pPr marL="1200150" lvl="2" indent="-285750">
+              <a:buFont typeface="Arial" panose="020B0604020202020204" pitchFamily="34" charset="0"/>
+              <a:buChar char="•"/>
+            </a:pPr>
+            <a:r>
+              <a:rPr lang="en-US" altLang="ko-KR" baseline="0" dirty="0" err="1" smtClean="0"/>
+              <a:t>Settings.settings</a:t>
+            </a:r>
+            <a:r>
+              <a:rPr lang="en-US" altLang="ko-KR" baseline="0" dirty="0" smtClean="0"/>
+              <a:t>: </a:t>
+            </a:r>
+            <a:r>
+              <a:rPr lang="ko-KR" altLang="en-US" baseline="0" dirty="0" smtClean="0"/>
+              <a:t>사용자 설정이나 앱 설정 등을 저장할 수 있는 </a:t>
+            </a:r>
+            <a:r>
+              <a:rPr lang="ko-KR" altLang="en-US" baseline="0" dirty="0" err="1" smtClean="0"/>
+              <a:t>구성파일</a:t>
+            </a:r>
+            <a:endParaRPr lang="ko-KR" altLang="en-US" dirty="0"/>
           </a:p>
           <a:p>
             <a:pPr marL="742950" lvl="1" indent="-285750">
@@ -2276,8 +2415,21 @@
             </a:r>
             <a:r>
               <a:rPr lang="ko-KR" altLang="en-US" dirty="0"/>
-              <a:t>참조하고 있는 외부 라이브러리</a:t>
-            </a:r>
+              <a:t>참조하고 있는 외부 </a:t>
+            </a:r>
+            <a:r>
+              <a:rPr lang="ko-KR" altLang="en-US" dirty="0" smtClean="0"/>
+              <a:t>라이브러리</a:t>
+            </a:r>
+            <a:r>
+              <a:rPr lang="en-US" altLang="ko-KR" baseline="0" dirty="0" smtClean="0"/>
+              <a:t> / .NET</a:t>
+            </a:r>
+            <a:r>
+              <a:rPr lang="ko-KR" altLang="en-US" baseline="0" dirty="0" smtClean="0"/>
+              <a:t>의 기본 클래스 라이브러리를 연결해주는 목록</a:t>
+            </a:r>
+            <a:endParaRPr lang="ko-KR" altLang="en-US" dirty="0"/>
           </a:p>
           <a:p>
             <a:pPr marL="742950" lvl="1" indent="-285750">
@@ -2308,8 +2460,94 @@
             </a:r>
             <a:r>
               <a:rPr lang="ko-KR" altLang="en-US" dirty="0"/>
-              <a:t>폼 디자인 및 이벤트 코드</a:t>
-            </a:r>
+              <a:t>폼 디자인 및 이벤트 </a:t>
+            </a:r>
+            <a:r>
+              <a:rPr lang="ko-KR" altLang="en-US" dirty="0" smtClean="0"/>
+              <a:t>코드</a:t>
+            </a:r>
+            <a:endParaRPr lang="en-US" altLang="ko-KR" dirty="0" smtClean="0"/>
+          </a:p>
+          <a:p>
+            <a:pPr marL="1200150" lvl="2" indent="-285750">
+              <a:buFont typeface="Arial" panose="020B0604020202020204" pitchFamily="34" charset="0"/>
+              <a:buChar char="•"/>
+            </a:pPr>
+            <a:r>
+              <a:rPr lang="ko-KR" altLang="en-US" dirty="0" err="1" smtClean="0"/>
+              <a:t>ㄴ</a:t>
+            </a:r>
+            <a:r>
+              <a:rPr lang="ko-KR" altLang="en-US" dirty="0" smtClean="0"/>
+              <a:t> 사용자가 보는 </a:t>
+            </a:r>
+            <a:r>
+              <a:rPr lang="en-US" altLang="ko-KR" dirty="0" smtClean="0"/>
+              <a:t>UI </a:t>
+            </a:r>
+            <a:r>
+              <a:rPr lang="ko-KR" altLang="en-US" dirty="0" smtClean="0"/>
+              <a:t>폼의 코드 뒤쪽</a:t>
+            </a:r>
+            <a:endParaRPr lang="en-US" altLang="ko-KR" dirty="0" smtClean="0"/>
+          </a:p>
+          <a:p>
+            <a:pPr marL="1200150" lvl="2" indent="-285750">
+              <a:buFont typeface="Arial" panose="020B0604020202020204" pitchFamily="34" charset="0"/>
+              <a:buChar char="•"/>
+            </a:pPr>
+            <a:r>
+              <a:rPr lang="en-US" altLang="ko-KR" dirty="0" smtClean="0"/>
+              <a:t>Form1.Designer.cs : </a:t>
+            </a:r>
+            <a:r>
+              <a:rPr lang="ko-KR" altLang="en-US" dirty="0" smtClean="0"/>
+              <a:t>폼의 디자인 요소의 위치</a:t>
+            </a:r>
+            <a:r>
+              <a:rPr lang="en-US" altLang="ko-KR" dirty="0" smtClean="0"/>
+              <a:t>, </a:t>
+            </a:r>
+            <a:r>
+              <a:rPr lang="ko-KR" altLang="en-US" dirty="0" smtClean="0"/>
+              <a:t>크기</a:t>
+            </a:r>
+            <a:r>
+              <a:rPr lang="en-US" altLang="ko-KR" dirty="0" smtClean="0"/>
+              <a:t>, </a:t>
+            </a:r>
+            <a:r>
+              <a:rPr lang="ko-KR" altLang="en-US" dirty="0" smtClean="0"/>
+              <a:t>속성 등을 저장하는 파일</a:t>
+            </a:r>
+            <a:endParaRPr lang="en-US" altLang="ko-KR" dirty="0" smtClean="0"/>
+          </a:p>
+          <a:p>
+            <a:pPr marL="1657350" lvl="3" indent="-285750">
+              <a:buFont typeface="Arial" panose="020B0604020202020204" pitchFamily="34" charset="0"/>
+              <a:buChar char="•"/>
+            </a:pPr>
+            <a:r>
+              <a:rPr lang="ko-KR" altLang="en-US" dirty="0" err="1" smtClean="0"/>
+              <a:t>ㄴ</a:t>
+            </a:r>
+            <a:r>
+              <a:rPr lang="ko-KR" altLang="en-US" dirty="0" smtClean="0"/>
+              <a:t> 디자이너 창을 통해 작성 </a:t>
+            </a:r>
+            <a:r>
+              <a:rPr lang="en-US" altLang="ko-KR" dirty="0" smtClean="0"/>
+              <a:t>/ </a:t>
+            </a:r>
+            <a:r>
+              <a:rPr lang="ko-KR" altLang="en-US" dirty="0" smtClean="0"/>
+              <a:t>직접 수정하지 않는 것이 원칙</a:t>
+            </a:r>
+            <a:r>
+              <a:rPr lang="en-US" altLang="ko-KR" dirty="0" smtClean="0"/>
+              <a:t>.</a:t>
+            </a:r>
+            <a:endParaRPr lang="ko-KR" altLang="en-US" dirty="0"/>
           </a:p>
           <a:p>
             <a:pPr marL="742950" lvl="1" indent="-285750">
@@ -2326,8 +2564,56 @@
             </a:r>
             <a:r>
               <a:rPr lang="ko-KR" altLang="en-US" dirty="0"/>
-              <a:t>메인 실행 파일</a:t>
-            </a:r>
+              <a:t>메인 실행 </a:t>
+            </a:r>
+            <a:r>
+              <a:rPr lang="ko-KR" altLang="en-US" dirty="0" smtClean="0"/>
+              <a:t>파일</a:t>
+            </a:r>
+            <a:endParaRPr lang="en-US" altLang="ko-KR" dirty="0" smtClean="0"/>
+          </a:p>
+          <a:p>
+            <a:pPr marL="1200150" lvl="2" indent="-285750">
+              <a:buFont typeface="Arial" panose="020B0604020202020204" pitchFamily="34" charset="0"/>
+              <a:buChar char="•"/>
+            </a:pPr>
+            <a:r>
+              <a:rPr lang="ko-KR" altLang="en-US" dirty="0" err="1" smtClean="0"/>
+              <a:t>ㄴ</a:t>
+            </a:r>
+            <a:r>
+              <a:rPr lang="ko-KR" altLang="en-US" dirty="0" smtClean="0"/>
+              <a:t> 애플리케이션의 </a:t>
+            </a:r>
+            <a:r>
+              <a:rPr lang="en-US" altLang="ko-KR" dirty="0" smtClean="0"/>
+              <a:t>＂</a:t>
+            </a:r>
+            <a:r>
+              <a:rPr lang="ko-KR" altLang="en-US" dirty="0" smtClean="0"/>
+              <a:t>시작 지점</a:t>
+            </a:r>
+            <a:r>
+              <a:rPr lang="en-US" altLang="ko-KR" dirty="0" smtClean="0"/>
+              <a:t>(main </a:t>
+            </a:r>
+            <a:r>
+              <a:rPr lang="ko-KR" altLang="en-US" dirty="0" smtClean="0"/>
+              <a:t>메서드</a:t>
+            </a:r>
+            <a:r>
+              <a:rPr lang="en-US" altLang="ko-KR" dirty="0" smtClean="0"/>
+              <a:t>)＂</a:t>
+            </a:r>
+            <a:r>
+              <a:rPr lang="ko-KR" altLang="en-US" dirty="0" smtClean="0"/>
+              <a:t>이 정의된 파일</a:t>
+            </a:r>
+            <a:r>
+              <a:rPr lang="en-US" altLang="ko-KR" dirty="0" smtClean="0"/>
+              <a:t>.</a:t>
+            </a:r>
+            <a:endParaRPr lang="ko-KR" altLang="en-US" dirty="0"/>
           </a:p>
           <a:p>
             <a:endParaRPr lang="en-US" altLang="ko-KR" dirty="0"/>
@@ -5168,7 +5454,7 @@
               <a:t>, </a:t>
             </a:r>
             <a:r>
-              <a:rPr lang="ko-KR" altLang="en-US"/>
+              <a:rPr lang="ko-KR" altLang="en-US" dirty="0"/>
               <a:t>또는 콘솔 앱 사용</a:t>
             </a:r>
             <a:endParaRPr lang="en-US" altLang="ko-KR" dirty="0"/>
@@ -9028,7 +9314,7 @@
           <a:p>
             <a:fld id="{442BEE3F-2E9A-4FD8-8B8A-8619F3E161C0}" type="datetime1">
               <a:rPr lang="ko-KR" altLang="en-US" smtClean="0"/>
-              <a:t>2025-04-23</a:t>
+              <a:t>2025-04-25</a:t>
             </a:fld>
             <a:endParaRPr lang="ko-KR" altLang="en-US"/>
           </a:p>
@@ -9214,7 +9500,7 @@
           <a:p>
             <a:fld id="{2EAE422B-0E68-47B5-84BB-CA2BDA8EE46C}" type="datetime1">
               <a:rPr lang="ko-KR" altLang="en-US" smtClean="0"/>
-              <a:t>2025-04-23</a:t>
+              <a:t>2025-04-25</a:t>
             </a:fld>
             <a:endParaRPr lang="ko-KR" altLang="en-US"/>
           </a:p>
@@ -9422,7 +9708,7 @@
           <a:p>
             <a:fld id="{AF7C623F-179B-417F-99B6-50F6DF228D4B}" type="datetime1">
               <a:rPr lang="ko-KR" altLang="en-US" smtClean="0"/>
-              <a:t>2025-04-23</a:t>
+              <a:t>2025-04-25</a:t>
             </a:fld>
             <a:endParaRPr lang="ko-KR" altLang="en-US"/>
           </a:p>
@@ -9651,7 +9937,7 @@
           <a:p>
             <a:fld id="{0F78D9C4-20C1-4B15-A116-16DC77AD9A1E}" type="datetime1">
               <a:rPr lang="ko-KR" altLang="en-US" smtClean="0"/>
-              <a:t>2025-04-23</a:t>
+              <a:t>2025-04-25</a:t>
             </a:fld>
             <a:endParaRPr lang="ko-KR" altLang="en-US"/>
           </a:p>
@@ -9926,7 +10212,7 @@
           <a:p>
             <a:fld id="{C7F43723-C509-4DEA-8428-B50818F79709}" type="datetime1">
               <a:rPr lang="ko-KR" altLang="en-US" smtClean="0"/>
-              <a:t>2025-04-23</a:t>
+              <a:t>2025-04-25</a:t>
             </a:fld>
             <a:endParaRPr lang="ko-KR" altLang="en-US"/>
           </a:p>
@@ -10191,7 +10477,7 @@
           <a:p>
             <a:fld id="{5D2B7482-EE74-4DBD-97F4-D0DAC0C0E4E5}" type="datetime1">
               <a:rPr lang="ko-KR" altLang="en-US" smtClean="0"/>
-              <a:t>2025-04-23</a:t>
+              <a:t>2025-04-25</a:t>
             </a:fld>
             <a:endParaRPr lang="ko-KR" altLang="en-US"/>
           </a:p>
@@ -10604,7 +10890,7 @@
           <a:p>
             <a:fld id="{051A8C49-CED7-4A86-9B4A-621D7F62EE92}" type="datetime1">
               <a:rPr lang="ko-KR" altLang="en-US" smtClean="0"/>
-              <a:t>2025-04-23</a:t>
+              <a:t>2025-04-25</a:t>
             </a:fld>
             <a:endParaRPr lang="ko-KR" altLang="en-US"/>
           </a:p>
@@ -10756,7 +11042,7 @@
           <a:p>
             <a:fld id="{84082D76-7079-412D-848B-E1B9E7A6A286}" type="datetime1">
               <a:rPr lang="ko-KR" altLang="en-US" smtClean="0"/>
-              <a:t>2025-04-23</a:t>
+              <a:t>2025-04-25</a:t>
             </a:fld>
             <a:endParaRPr lang="ko-KR" altLang="en-US"/>
           </a:p>
@@ -10869,7 +11155,7 @@
           <a:p>
             <a:fld id="{10C5FEB5-5F88-4F49-9108-1795E314F09F}" type="datetime1">
               <a:rPr lang="ko-KR" altLang="en-US" smtClean="0"/>
-              <a:t>2025-04-23</a:t>
+              <a:t>2025-04-25</a:t>
             </a:fld>
             <a:endParaRPr lang="ko-KR" altLang="en-US"/>
           </a:p>
@@ -11180,7 +11466,7 @@
           <a:p>
             <a:fld id="{E37ABBEE-D8D4-48AD-9887-4DC578B8A684}" type="datetime1">
               <a:rPr lang="ko-KR" altLang="en-US" smtClean="0"/>
-              <a:t>2025-04-23</a:t>
+              <a:t>2025-04-25</a:t>
             </a:fld>
             <a:endParaRPr lang="ko-KR" altLang="en-US"/>
           </a:p>
@@ -11471,7 +11757,7 @@
           <a:p>
             <a:fld id="{A2D6A55C-F3DD-45DD-9D50-F8680410167D}" type="datetime1">
               <a:rPr lang="ko-KR" altLang="en-US" smtClean="0"/>
-              <a:t>2025-04-23</a:t>
+              <a:t>2025-04-25</a:t>
             </a:fld>
             <a:endParaRPr lang="ko-KR" altLang="en-US"/>
           </a:p>
@@ -11715,7 +12001,7 @@
             <a:fld id="{7F5E23C3-0E3D-4E4E-8486-D7FB4C073DC1}" type="datetime1">
               <a:rPr lang="ko-KR" altLang="en-US" smtClean="0"/>
               <a:pPr/>
-              <a:t>2025-04-23</a:t>
+              <a:t>2025-04-25</a:t>
             </a:fld>
             <a:endParaRPr lang="ko-KR" altLang="en-US" dirty="0"/>
           </a:p>
@@ -12242,7 +12528,7 @@
           <a:p>
             <a:fld id="{2E2BEDFA-D8AA-4914-9440-7DF713C99FA9}" type="datetime1">
               <a:rPr lang="ko-KR" altLang="en-US" smtClean="0"/>
-              <a:t>2025-04-23</a:t>
+              <a:t>2025-04-25</a:t>
             </a:fld>
             <a:endParaRPr lang="ko-KR" altLang="en-US" dirty="0"/>
           </a:p>
@@ -12330,7 +12616,7 @@
           <a:p>
             <a:fld id="{0F78D9C4-20C1-4B15-A116-16DC77AD9A1E}" type="datetime1">
               <a:rPr lang="ko-KR" altLang="en-US" smtClean="0"/>
-              <a:t>2025-04-23</a:t>
+              <a:t>2025-04-25</a:t>
             </a:fld>
             <a:endParaRPr lang="ko-KR" altLang="en-US"/>
           </a:p>
@@ -12539,7 +12825,7 @@
           <a:p>
             <a:fld id="{2E2BEDFA-D8AA-4914-9440-7DF713C99FA9}" type="datetime1">
               <a:rPr lang="ko-KR" altLang="en-US" smtClean="0"/>
-              <a:t>2025-04-23</a:t>
+              <a:t>2025-04-25</a:t>
             </a:fld>
             <a:endParaRPr lang="ko-KR" altLang="en-US" dirty="0"/>
           </a:p>
@@ -12659,7 +12945,7 @@
           <a:p>
             <a:fld id="{0F78D9C4-20C1-4B15-A116-16DC77AD9A1E}" type="datetime1">
               <a:rPr lang="ko-KR" altLang="en-US" smtClean="0"/>
-              <a:t>2025-04-23</a:t>
+              <a:t>2025-04-25</a:t>
             </a:fld>
             <a:endParaRPr lang="ko-KR" altLang="en-US"/>
           </a:p>
@@ -12929,7 +13215,7 @@
           <a:p>
             <a:fld id="{0F78D9C4-20C1-4B15-A116-16DC77AD9A1E}" type="datetime1">
               <a:rPr lang="ko-KR" altLang="en-US" smtClean="0"/>
-              <a:t>2025-04-23</a:t>
+              <a:t>2025-04-25</a:t>
             </a:fld>
             <a:endParaRPr lang="ko-KR" altLang="en-US"/>
           </a:p>
@@ -13261,7 +13547,7 @@
           <a:p>
             <a:fld id="{0F78D9C4-20C1-4B15-A116-16DC77AD9A1E}" type="datetime1">
               <a:rPr lang="ko-KR" altLang="en-US" smtClean="0"/>
-              <a:t>2025-04-23</a:t>
+              <a:t>2025-04-25</a:t>
             </a:fld>
             <a:endParaRPr lang="ko-KR" altLang="en-US"/>
           </a:p>
@@ -13511,7 +13797,7 @@
           <a:p>
             <a:fld id="{0F78D9C4-20C1-4B15-A116-16DC77AD9A1E}" type="datetime1">
               <a:rPr lang="ko-KR" altLang="en-US" smtClean="0"/>
-              <a:t>2025-04-24</a:t>
+              <a:t>2025-04-25</a:t>
             </a:fld>
             <a:endParaRPr lang="ko-KR" altLang="en-US"/>
           </a:p>
@@ -13737,7 +14023,7 @@
           <a:p>
             <a:fld id="{0F78D9C4-20C1-4B15-A116-16DC77AD9A1E}" type="datetime1">
               <a:rPr lang="ko-KR" altLang="en-US" smtClean="0"/>
-              <a:t>2025-04-23</a:t>
+              <a:t>2025-04-25</a:t>
             </a:fld>
             <a:endParaRPr lang="ko-KR" altLang="en-US"/>
           </a:p>
@@ -14021,7 +14307,7 @@
           <a:p>
             <a:fld id="{0F78D9C4-20C1-4B15-A116-16DC77AD9A1E}" type="datetime1">
               <a:rPr lang="ko-KR" altLang="en-US" smtClean="0"/>
-              <a:t>2025-04-23</a:t>
+              <a:t>2025-04-25</a:t>
             </a:fld>
             <a:endParaRPr lang="ko-KR" altLang="en-US"/>
           </a:p>
@@ -14137,7 +14423,7 @@
           <a:p>
             <a:fld id="{0F78D9C4-20C1-4B15-A116-16DC77AD9A1E}" type="datetime1">
               <a:rPr lang="ko-KR" altLang="en-US" smtClean="0"/>
-              <a:t>2025-04-23</a:t>
+              <a:t>2025-04-25</a:t>
             </a:fld>
             <a:endParaRPr lang="ko-KR" altLang="en-US"/>
           </a:p>
@@ -14813,7 +15099,7 @@
           <a:p>
             <a:fld id="{0F78D9C4-20C1-4B15-A116-16DC77AD9A1E}" type="datetime1">
               <a:rPr lang="ko-KR" altLang="en-US" smtClean="0"/>
-              <a:t>2025-04-23</a:t>
+              <a:t>2025-04-25</a:t>
             </a:fld>
             <a:endParaRPr lang="ko-KR" altLang="en-US"/>
           </a:p>
@@ -15057,7 +15343,7 @@
           <a:p>
             <a:fld id="{0F78D9C4-20C1-4B15-A116-16DC77AD9A1E}" type="datetime1">
               <a:rPr lang="ko-KR" altLang="en-US" smtClean="0"/>
-              <a:t>2025-04-23</a:t>
+              <a:t>2025-04-25</a:t>
             </a:fld>
             <a:endParaRPr lang="ko-KR" altLang="en-US"/>
           </a:p>
@@ -15518,7 +15804,7 @@
           <a:p>
             <a:fld id="{0F78D9C4-20C1-4B15-A116-16DC77AD9A1E}" type="datetime1">
               <a:rPr lang="ko-KR" altLang="en-US" smtClean="0"/>
-              <a:t>2025-04-23</a:t>
+              <a:t>2025-04-25</a:t>
             </a:fld>
             <a:endParaRPr lang="ko-KR" altLang="en-US"/>
           </a:p>
@@ -15731,7 +16017,7 @@
           <a:p>
             <a:fld id="{0F78D9C4-20C1-4B15-A116-16DC77AD9A1E}" type="datetime1">
               <a:rPr lang="ko-KR" altLang="en-US" smtClean="0"/>
-              <a:t>2025-04-23</a:t>
+              <a:t>2025-04-25</a:t>
             </a:fld>
             <a:endParaRPr lang="ko-KR" altLang="en-US"/>
           </a:p>
@@ -16053,7 +16339,7 @@
           <a:p>
             <a:fld id="{0F78D9C4-20C1-4B15-A116-16DC77AD9A1E}" type="datetime1">
               <a:rPr lang="ko-KR" altLang="en-US" smtClean="0"/>
-              <a:t>2025-04-23</a:t>
+              <a:t>2025-04-25</a:t>
             </a:fld>
             <a:endParaRPr lang="ko-KR" altLang="en-US"/>
           </a:p>
@@ -16502,7 +16788,7 @@
           <a:p>
             <a:fld id="{0F78D9C4-20C1-4B15-A116-16DC77AD9A1E}" type="datetime1">
               <a:rPr lang="ko-KR" altLang="en-US" smtClean="0"/>
-              <a:t>2025-04-23</a:t>
+              <a:t>2025-04-25</a:t>
             </a:fld>
             <a:endParaRPr lang="ko-KR" altLang="en-US"/>
           </a:p>
@@ -16834,7 +17120,7 @@
           <a:p>
             <a:fld id="{0F78D9C4-20C1-4B15-A116-16DC77AD9A1E}" type="datetime1">
               <a:rPr lang="ko-KR" altLang="en-US" smtClean="0"/>
-              <a:t>2025-04-23</a:t>
+              <a:t>2025-04-25</a:t>
             </a:fld>
             <a:endParaRPr lang="ko-KR" altLang="en-US"/>
           </a:p>
@@ -17320,7 +17606,7 @@
           <a:p>
             <a:fld id="{0F78D9C4-20C1-4B15-A116-16DC77AD9A1E}" type="datetime1">
               <a:rPr lang="ko-KR" altLang="en-US" smtClean="0"/>
-              <a:t>2025-04-24</a:t>
+              <a:t>2025-04-25</a:t>
             </a:fld>
             <a:endParaRPr lang="ko-KR" altLang="en-US"/>
           </a:p>
@@ -17899,7 +18185,7 @@
           <a:p>
             <a:fld id="{0F78D9C4-20C1-4B15-A116-16DC77AD9A1E}" type="datetime1">
               <a:rPr lang="ko-KR" altLang="en-US" smtClean="0"/>
-              <a:t>2025-04-24</a:t>
+              <a:t>2025-04-25</a:t>
             </a:fld>
             <a:endParaRPr lang="ko-KR" altLang="en-US"/>
           </a:p>
@@ -18244,7 +18530,7 @@
           <a:p>
             <a:fld id="{0F78D9C4-20C1-4B15-A116-16DC77AD9A1E}" type="datetime1">
               <a:rPr lang="ko-KR" altLang="en-US" smtClean="0"/>
-              <a:t>2025-04-23</a:t>
+              <a:t>2025-04-25</a:t>
             </a:fld>
             <a:endParaRPr lang="ko-KR" altLang="en-US"/>
           </a:p>
@@ -18587,7 +18873,7 @@
           <a:p>
             <a:fld id="{0F78D9C4-20C1-4B15-A116-16DC77AD9A1E}" type="datetime1">
               <a:rPr lang="ko-KR" altLang="en-US" smtClean="0"/>
-              <a:t>2025-04-23</a:t>
+              <a:t>2025-04-25</a:t>
             </a:fld>
             <a:endParaRPr lang="ko-KR" altLang="en-US"/>
           </a:p>
@@ -19122,7 +19408,7 @@
           <a:p>
             <a:fld id="{0F78D9C4-20C1-4B15-A116-16DC77AD9A1E}" type="datetime1">
               <a:rPr lang="ko-KR" altLang="en-US" smtClean="0"/>
-              <a:t>2025-04-23</a:t>
+              <a:t>2025-04-25</a:t>
             </a:fld>
             <a:endParaRPr lang="ko-KR" altLang="en-US"/>
           </a:p>
@@ -19368,7 +19654,7 @@
           <a:p>
             <a:fld id="{0F78D9C4-20C1-4B15-A116-16DC77AD9A1E}" type="datetime1">
               <a:rPr lang="ko-KR" altLang="en-US" smtClean="0"/>
-              <a:t>2025-04-24</a:t>
+              <a:t>2025-04-25</a:t>
             </a:fld>
             <a:endParaRPr lang="ko-KR" altLang="en-US"/>
           </a:p>
@@ -19574,11 +19860,11 @@
   <p:clrMapOvr>
     <a:masterClrMapping/>
   </p:clrMapOvr>
-  <mc:AlternateContent xmlns:mc="http://schemas.openxmlformats.org/markup-compatibility/2006">
-    <mc:Choice xmlns:p14="http://schemas.microsoft.com/office/powerpoint/2010/main" Requires="p14">
+  <mc:AlternateContent xmlns:mc="http://schemas.openxmlformats.org/markup-compatibility/2006" xmlns:p14="http://schemas.microsoft.com/office/powerpoint/2010/main">
+    <mc:Choice Requires="p14">
       <p:transition spd="slow" p14:dur="2000"/>
     </mc:Choice>
-    <mc:Fallback>
+    <mc:Fallback xmlns="">
       <p:transition spd="slow"/>
     </mc:Fallback>
   </mc:AlternateContent>
@@ -19683,7 +19969,7 @@
           <a:p>
             <a:fld id="{0F78D9C4-20C1-4B15-A116-16DC77AD9A1E}" type="datetime1">
               <a:rPr lang="ko-KR" altLang="en-US" smtClean="0"/>
-              <a:t>2025-04-23</a:t>
+              <a:t>2025-04-25</a:t>
             </a:fld>
             <a:endParaRPr lang="ko-KR" altLang="en-US"/>
           </a:p>
@@ -20236,7 +20522,7 @@
           <a:p>
             <a:fld id="{0F78D9C4-20C1-4B15-A116-16DC77AD9A1E}" type="datetime1">
               <a:rPr lang="ko-KR" altLang="en-US" smtClean="0"/>
-              <a:t>2025-04-23</a:t>
+              <a:t>2025-04-25</a:t>
             </a:fld>
             <a:endParaRPr lang="ko-KR" altLang="en-US"/>
           </a:p>
@@ -20377,7 +20663,7 @@
           <a:p>
             <a:fld id="{0F78D9C4-20C1-4B15-A116-16DC77AD9A1E}" type="datetime1">
               <a:rPr lang="ko-KR" altLang="en-US" smtClean="0"/>
-              <a:t>2025-04-23</a:t>
+              <a:t>2025-04-25</a:t>
             </a:fld>
             <a:endParaRPr lang="ko-KR" altLang="en-US"/>
           </a:p>
@@ -20714,7 +21000,7 @@
           <a:p>
             <a:fld id="{0F78D9C4-20C1-4B15-A116-16DC77AD9A1E}" type="datetime1">
               <a:rPr lang="ko-KR" altLang="en-US" smtClean="0"/>
-              <a:t>2025-04-23</a:t>
+              <a:t>2025-04-25</a:t>
             </a:fld>
             <a:endParaRPr lang="ko-KR" altLang="en-US"/>
           </a:p>
@@ -21397,7 +21683,7 @@
           <a:p>
             <a:fld id="{0F78D9C4-20C1-4B15-A116-16DC77AD9A1E}" type="datetime1">
               <a:rPr lang="ko-KR" altLang="en-US" smtClean="0"/>
-              <a:t>2025-04-23</a:t>
+              <a:t>2025-04-25</a:t>
             </a:fld>
             <a:endParaRPr lang="ko-KR" altLang="en-US"/>
           </a:p>
@@ -21725,7 +22011,7 @@
           <a:p>
             <a:fld id="{0F78D9C4-20C1-4B15-A116-16DC77AD9A1E}" type="datetime1">
               <a:rPr lang="ko-KR" altLang="en-US" smtClean="0"/>
-              <a:t>2025-04-24</a:t>
+              <a:t>2025-04-25</a:t>
             </a:fld>
             <a:endParaRPr lang="ko-KR" altLang="en-US"/>
           </a:p>
@@ -21901,7 +22187,7 @@
           <a:p>
             <a:fld id="{0F78D9C4-20C1-4B15-A116-16DC77AD9A1E}" type="datetime1">
               <a:rPr lang="ko-KR" altLang="en-US" smtClean="0"/>
-              <a:t>2025-04-23</a:t>
+              <a:t>2025-04-25</a:t>
             </a:fld>
             <a:endParaRPr lang="ko-KR" altLang="en-US"/>
           </a:p>
@@ -22258,7 +22544,7 @@
           <a:p>
             <a:fld id="{0F78D9C4-20C1-4B15-A116-16DC77AD9A1E}" type="datetime1">
               <a:rPr lang="ko-KR" altLang="en-US" smtClean="0"/>
-              <a:t>2025-04-24</a:t>
+              <a:t>2025-04-25</a:t>
             </a:fld>
             <a:endParaRPr lang="ko-KR" altLang="en-US"/>
           </a:p>
@@ -22374,7 +22660,7 @@
           <a:p>
             <a:fld id="{0F78D9C4-20C1-4B15-A116-16DC77AD9A1E}" type="datetime1">
               <a:rPr lang="ko-KR" altLang="en-US" smtClean="0"/>
-              <a:t>2025-04-23</a:t>
+              <a:t>2025-04-25</a:t>
             </a:fld>
             <a:endParaRPr lang="ko-KR" altLang="en-US"/>
           </a:p>

</xml_diff>